<commit_message>
simple addition in agenda
</commit_message>
<xml_diff>
--- a/Project_progress_Agenda.pptx
+++ b/Project_progress_Agenda.pptx
@@ -253,7 +253,7 @@
           <a:p>
             <a:fld id="{88AD2840-A1B5-46D5-88CF-FF803D9C05FA}" type="datetimeFigureOut">
               <a:rPr lang="en-US" smtClean="0"/>
-              <a:t>04-Apr-20</a:t>
+              <a:t>4/4/2020</a:t>
             </a:fld>
             <a:endParaRPr lang="en-US"/>
           </a:p>
@@ -421,7 +421,7 @@
           <a:p>
             <a:fld id="{88AD2840-A1B5-46D5-88CF-FF803D9C05FA}" type="datetimeFigureOut">
               <a:rPr lang="en-US" smtClean="0"/>
-              <a:t>04-Apr-20</a:t>
+              <a:t>4/4/2020</a:t>
             </a:fld>
             <a:endParaRPr lang="en-US"/>
           </a:p>
@@ -599,7 +599,7 @@
           <a:p>
             <a:fld id="{88AD2840-A1B5-46D5-88CF-FF803D9C05FA}" type="datetimeFigureOut">
               <a:rPr lang="en-US" smtClean="0"/>
-              <a:t>04-Apr-20</a:t>
+              <a:t>4/4/2020</a:t>
             </a:fld>
             <a:endParaRPr lang="en-US"/>
           </a:p>
@@ -767,7 +767,7 @@
           <a:p>
             <a:fld id="{88AD2840-A1B5-46D5-88CF-FF803D9C05FA}" type="datetimeFigureOut">
               <a:rPr lang="en-US" smtClean="0"/>
-              <a:t>04-Apr-20</a:t>
+              <a:t>4/4/2020</a:t>
             </a:fld>
             <a:endParaRPr lang="en-US"/>
           </a:p>
@@ -1012,7 +1012,7 @@
           <a:p>
             <a:fld id="{88AD2840-A1B5-46D5-88CF-FF803D9C05FA}" type="datetimeFigureOut">
               <a:rPr lang="en-US" smtClean="0"/>
-              <a:t>04-Apr-20</a:t>
+              <a:t>4/4/2020</a:t>
             </a:fld>
             <a:endParaRPr lang="en-US"/>
           </a:p>
@@ -1241,7 +1241,7 @@
           <a:p>
             <a:fld id="{88AD2840-A1B5-46D5-88CF-FF803D9C05FA}" type="datetimeFigureOut">
               <a:rPr lang="en-US" smtClean="0"/>
-              <a:t>04-Apr-20</a:t>
+              <a:t>4/4/2020</a:t>
             </a:fld>
             <a:endParaRPr lang="en-US"/>
           </a:p>
@@ -1605,7 +1605,7 @@
           <a:p>
             <a:fld id="{88AD2840-A1B5-46D5-88CF-FF803D9C05FA}" type="datetimeFigureOut">
               <a:rPr lang="en-US" smtClean="0"/>
-              <a:t>04-Apr-20</a:t>
+              <a:t>4/4/2020</a:t>
             </a:fld>
             <a:endParaRPr lang="en-US"/>
           </a:p>
@@ -1722,7 +1722,7 @@
           <a:p>
             <a:fld id="{88AD2840-A1B5-46D5-88CF-FF803D9C05FA}" type="datetimeFigureOut">
               <a:rPr lang="en-US" smtClean="0"/>
-              <a:t>04-Apr-20</a:t>
+              <a:t>4/4/2020</a:t>
             </a:fld>
             <a:endParaRPr lang="en-US"/>
           </a:p>
@@ -1817,7 +1817,7 @@
           <a:p>
             <a:fld id="{88AD2840-A1B5-46D5-88CF-FF803D9C05FA}" type="datetimeFigureOut">
               <a:rPr lang="en-US" smtClean="0"/>
-              <a:t>04-Apr-20</a:t>
+              <a:t>4/4/2020</a:t>
             </a:fld>
             <a:endParaRPr lang="en-US"/>
           </a:p>
@@ -2092,7 +2092,7 @@
           <a:p>
             <a:fld id="{88AD2840-A1B5-46D5-88CF-FF803D9C05FA}" type="datetimeFigureOut">
               <a:rPr lang="en-US" smtClean="0"/>
-              <a:t>04-Apr-20</a:t>
+              <a:t>4/4/2020</a:t>
             </a:fld>
             <a:endParaRPr lang="en-US"/>
           </a:p>
@@ -2344,7 +2344,7 @@
           <a:p>
             <a:fld id="{88AD2840-A1B5-46D5-88CF-FF803D9C05FA}" type="datetimeFigureOut">
               <a:rPr lang="en-US" smtClean="0"/>
-              <a:t>04-Apr-20</a:t>
+              <a:t>4/4/2020</a:t>
             </a:fld>
             <a:endParaRPr lang="en-US"/>
           </a:p>
@@ -2555,7 +2555,7 @@
           <a:p>
             <a:fld id="{88AD2840-A1B5-46D5-88CF-FF803D9C05FA}" type="datetimeFigureOut">
               <a:rPr lang="en-US" smtClean="0"/>
-              <a:t>04-Apr-20</a:t>
+              <a:t>4/4/2020</a:t>
             </a:fld>
             <a:endParaRPr lang="en-US"/>
           </a:p>
@@ -14643,14 +14643,14 @@
           <p:nvPr>
             <p:extLst>
               <p:ext uri="{D42A27DB-BD31-4B8C-83A1-F6EECF244321}">
-                <p14:modId xmlns:p14="http://schemas.microsoft.com/office/powerpoint/2010/main" val="3429500052"/>
+                <p14:modId xmlns:p14="http://schemas.microsoft.com/office/powerpoint/2010/main" val="3687486478"/>
               </p:ext>
             </p:extLst>
           </p:nvPr>
         </p:nvGraphicFramePr>
         <p:xfrm>
           <a:off x="1183818" y="2714920"/>
-          <a:ext cx="9864396" cy="3581400"/>
+          <a:ext cx="9864396" cy="3779520"/>
         </p:xfrm>
         <a:graphic>
           <a:graphicData uri="http://schemas.openxmlformats.org/drawingml/2006/table">
@@ -15064,7 +15064,7 @@
                           <a:latin typeface="Arial" panose="020B0604020202020204" pitchFamily="34" charset="0"/>
                           <a:cs typeface="Arial" panose="020B0604020202020204" pitchFamily="34" charset="0"/>
                         </a:rPr>
-                        <a:t>Implementing the Sequencer</a:t>
+                        <a:t>Implementing Sequence, Sequence items and Packages</a:t>
                       </a:r>
                     </a:p>
                   </a:txBody>
@@ -15675,7 +15675,7 @@
                 <a:latin typeface="Arial" panose="020B0604020202020204" pitchFamily="34" charset="0"/>
                 <a:cs typeface="Arial" panose="020B0604020202020204" pitchFamily="34" charset="0"/>
               </a:rPr>
-              <a:t>or any available core with the same specifications</a:t>
+              <a:t>or any available core with the same instructions</a:t>
             </a:r>
             <a:r>
               <a:rPr lang="en-US" sz="2400" dirty="0">

</xml_diff>

<commit_message>
Revert "Merge branch 'master' of https://github.com/cufeolm/codeGP"
This reverts commit 9d8e3a4d4f5c2264ad1e720bfc7e25c20058d3b5, reversing
changes made to c36dcfc5da13781321553201354dd6c563957d06.
</commit_message>
<xml_diff>
--- a/Project_progress_Agenda.pptx
+++ b/Project_progress_Agenda.pptx
@@ -253,7 +253,7 @@
           <a:p>
             <a:fld id="{88AD2840-A1B5-46D5-88CF-FF803D9C05FA}" type="datetimeFigureOut">
               <a:rPr lang="en-US" smtClean="0"/>
-              <a:t>04-Apr-20</a:t>
+              <a:t>4/4/2020</a:t>
             </a:fld>
             <a:endParaRPr lang="en-US"/>
           </a:p>
@@ -421,7 +421,7 @@
           <a:p>
             <a:fld id="{88AD2840-A1B5-46D5-88CF-FF803D9C05FA}" type="datetimeFigureOut">
               <a:rPr lang="en-US" smtClean="0"/>
-              <a:t>04-Apr-20</a:t>
+              <a:t>4/4/2020</a:t>
             </a:fld>
             <a:endParaRPr lang="en-US"/>
           </a:p>
@@ -599,7 +599,7 @@
           <a:p>
             <a:fld id="{88AD2840-A1B5-46D5-88CF-FF803D9C05FA}" type="datetimeFigureOut">
               <a:rPr lang="en-US" smtClean="0"/>
-              <a:t>04-Apr-20</a:t>
+              <a:t>4/4/2020</a:t>
             </a:fld>
             <a:endParaRPr lang="en-US"/>
           </a:p>
@@ -767,7 +767,7 @@
           <a:p>
             <a:fld id="{88AD2840-A1B5-46D5-88CF-FF803D9C05FA}" type="datetimeFigureOut">
               <a:rPr lang="en-US" smtClean="0"/>
-              <a:t>04-Apr-20</a:t>
+              <a:t>4/4/2020</a:t>
             </a:fld>
             <a:endParaRPr lang="en-US"/>
           </a:p>
@@ -1012,7 +1012,7 @@
           <a:p>
             <a:fld id="{88AD2840-A1B5-46D5-88CF-FF803D9C05FA}" type="datetimeFigureOut">
               <a:rPr lang="en-US" smtClean="0"/>
-              <a:t>04-Apr-20</a:t>
+              <a:t>4/4/2020</a:t>
             </a:fld>
             <a:endParaRPr lang="en-US"/>
           </a:p>
@@ -1241,7 +1241,7 @@
           <a:p>
             <a:fld id="{88AD2840-A1B5-46D5-88CF-FF803D9C05FA}" type="datetimeFigureOut">
               <a:rPr lang="en-US" smtClean="0"/>
-              <a:t>04-Apr-20</a:t>
+              <a:t>4/4/2020</a:t>
             </a:fld>
             <a:endParaRPr lang="en-US"/>
           </a:p>
@@ -1605,7 +1605,7 @@
           <a:p>
             <a:fld id="{88AD2840-A1B5-46D5-88CF-FF803D9C05FA}" type="datetimeFigureOut">
               <a:rPr lang="en-US" smtClean="0"/>
-              <a:t>04-Apr-20</a:t>
+              <a:t>4/4/2020</a:t>
             </a:fld>
             <a:endParaRPr lang="en-US"/>
           </a:p>
@@ -1722,7 +1722,7 @@
           <a:p>
             <a:fld id="{88AD2840-A1B5-46D5-88CF-FF803D9C05FA}" type="datetimeFigureOut">
               <a:rPr lang="en-US" smtClean="0"/>
-              <a:t>04-Apr-20</a:t>
+              <a:t>4/4/2020</a:t>
             </a:fld>
             <a:endParaRPr lang="en-US"/>
           </a:p>
@@ -1817,7 +1817,7 @@
           <a:p>
             <a:fld id="{88AD2840-A1B5-46D5-88CF-FF803D9C05FA}" type="datetimeFigureOut">
               <a:rPr lang="en-US" smtClean="0"/>
-              <a:t>04-Apr-20</a:t>
+              <a:t>4/4/2020</a:t>
             </a:fld>
             <a:endParaRPr lang="en-US"/>
           </a:p>
@@ -2092,7 +2092,7 @@
           <a:p>
             <a:fld id="{88AD2840-A1B5-46D5-88CF-FF803D9C05FA}" type="datetimeFigureOut">
               <a:rPr lang="en-US" smtClean="0"/>
-              <a:t>04-Apr-20</a:t>
+              <a:t>4/4/2020</a:t>
             </a:fld>
             <a:endParaRPr lang="en-US"/>
           </a:p>
@@ -2344,7 +2344,7 @@
           <a:p>
             <a:fld id="{88AD2840-A1B5-46D5-88CF-FF803D9C05FA}" type="datetimeFigureOut">
               <a:rPr lang="en-US" smtClean="0"/>
-              <a:t>04-Apr-20</a:t>
+              <a:t>4/4/2020</a:t>
             </a:fld>
             <a:endParaRPr lang="en-US"/>
           </a:p>
@@ -2555,7 +2555,7 @@
           <a:p>
             <a:fld id="{88AD2840-A1B5-46D5-88CF-FF803D9C05FA}" type="datetimeFigureOut">
               <a:rPr lang="en-US" smtClean="0"/>
-              <a:t>04-Apr-20</a:t>
+              <a:t>4/4/2020</a:t>
             </a:fld>
             <a:endParaRPr lang="en-US"/>
           </a:p>
@@ -14643,7 +14643,7 @@
           <p:nvPr>
             <p:extLst>
               <p:ext uri="{D42A27DB-BD31-4B8C-83A1-F6EECF244321}">
-                <p14:modId xmlns:p14="http://schemas.microsoft.com/office/powerpoint/2010/main" val="2935704989"/>
+                <p14:modId xmlns:p14="http://schemas.microsoft.com/office/powerpoint/2010/main" val="3687486478"/>
               </p:ext>
             </p:extLst>
           </p:nvPr>
@@ -15064,19 +15064,8 @@
                           <a:latin typeface="Arial" panose="020B0604020202020204" pitchFamily="34" charset="0"/>
                           <a:cs typeface="Arial" panose="020B0604020202020204" pitchFamily="34" charset="0"/>
                         </a:rPr>
-                        <a:t>Implementing the Sequence, the Sequence items </a:t>
+                        <a:t>Implementing Sequence, Sequence items and Packages</a:t>
                       </a:r>
-                      <a:r>
-                        <a:rPr lang="en-US" sz="1300">
-                          <a:latin typeface="Arial" panose="020B0604020202020204" pitchFamily="34" charset="0"/>
-                          <a:cs typeface="Arial" panose="020B0604020202020204" pitchFamily="34" charset="0"/>
-                        </a:rPr>
-                        <a:t>and the Packages</a:t>
-                      </a:r>
-                      <a:endParaRPr lang="en-US" sz="1300" dirty="0">
-                        <a:latin typeface="Arial" panose="020B0604020202020204" pitchFamily="34" charset="0"/>
-                        <a:cs typeface="Arial" panose="020B0604020202020204" pitchFamily="34" charset="0"/>
-                      </a:endParaRPr>
                     </a:p>
                   </a:txBody>
                   <a:tcPr/>

</xml_diff>

<commit_message>
Revert "Revert "Merge branch 'master' of https://github.com/cufeolm/codeGP""
This reverts commit dc6254ac3f5e781d6dc6c0bd261a021d27fd6465.
</commit_message>
<xml_diff>
--- a/Project_progress_Agenda.pptx
+++ b/Project_progress_Agenda.pptx
@@ -253,7 +253,7 @@
           <a:p>
             <a:fld id="{88AD2840-A1B5-46D5-88CF-FF803D9C05FA}" type="datetimeFigureOut">
               <a:rPr lang="en-US" smtClean="0"/>
-              <a:t>4/4/2020</a:t>
+              <a:t>04-Apr-20</a:t>
             </a:fld>
             <a:endParaRPr lang="en-US"/>
           </a:p>
@@ -421,7 +421,7 @@
           <a:p>
             <a:fld id="{88AD2840-A1B5-46D5-88CF-FF803D9C05FA}" type="datetimeFigureOut">
               <a:rPr lang="en-US" smtClean="0"/>
-              <a:t>4/4/2020</a:t>
+              <a:t>04-Apr-20</a:t>
             </a:fld>
             <a:endParaRPr lang="en-US"/>
           </a:p>
@@ -599,7 +599,7 @@
           <a:p>
             <a:fld id="{88AD2840-A1B5-46D5-88CF-FF803D9C05FA}" type="datetimeFigureOut">
               <a:rPr lang="en-US" smtClean="0"/>
-              <a:t>4/4/2020</a:t>
+              <a:t>04-Apr-20</a:t>
             </a:fld>
             <a:endParaRPr lang="en-US"/>
           </a:p>
@@ -767,7 +767,7 @@
           <a:p>
             <a:fld id="{88AD2840-A1B5-46D5-88CF-FF803D9C05FA}" type="datetimeFigureOut">
               <a:rPr lang="en-US" smtClean="0"/>
-              <a:t>4/4/2020</a:t>
+              <a:t>04-Apr-20</a:t>
             </a:fld>
             <a:endParaRPr lang="en-US"/>
           </a:p>
@@ -1012,7 +1012,7 @@
           <a:p>
             <a:fld id="{88AD2840-A1B5-46D5-88CF-FF803D9C05FA}" type="datetimeFigureOut">
               <a:rPr lang="en-US" smtClean="0"/>
-              <a:t>4/4/2020</a:t>
+              <a:t>04-Apr-20</a:t>
             </a:fld>
             <a:endParaRPr lang="en-US"/>
           </a:p>
@@ -1241,7 +1241,7 @@
           <a:p>
             <a:fld id="{88AD2840-A1B5-46D5-88CF-FF803D9C05FA}" type="datetimeFigureOut">
               <a:rPr lang="en-US" smtClean="0"/>
-              <a:t>4/4/2020</a:t>
+              <a:t>04-Apr-20</a:t>
             </a:fld>
             <a:endParaRPr lang="en-US"/>
           </a:p>
@@ -1605,7 +1605,7 @@
           <a:p>
             <a:fld id="{88AD2840-A1B5-46D5-88CF-FF803D9C05FA}" type="datetimeFigureOut">
               <a:rPr lang="en-US" smtClean="0"/>
-              <a:t>4/4/2020</a:t>
+              <a:t>04-Apr-20</a:t>
             </a:fld>
             <a:endParaRPr lang="en-US"/>
           </a:p>
@@ -1722,7 +1722,7 @@
           <a:p>
             <a:fld id="{88AD2840-A1B5-46D5-88CF-FF803D9C05FA}" type="datetimeFigureOut">
               <a:rPr lang="en-US" smtClean="0"/>
-              <a:t>4/4/2020</a:t>
+              <a:t>04-Apr-20</a:t>
             </a:fld>
             <a:endParaRPr lang="en-US"/>
           </a:p>
@@ -1817,7 +1817,7 @@
           <a:p>
             <a:fld id="{88AD2840-A1B5-46D5-88CF-FF803D9C05FA}" type="datetimeFigureOut">
               <a:rPr lang="en-US" smtClean="0"/>
-              <a:t>4/4/2020</a:t>
+              <a:t>04-Apr-20</a:t>
             </a:fld>
             <a:endParaRPr lang="en-US"/>
           </a:p>
@@ -2092,7 +2092,7 @@
           <a:p>
             <a:fld id="{88AD2840-A1B5-46D5-88CF-FF803D9C05FA}" type="datetimeFigureOut">
               <a:rPr lang="en-US" smtClean="0"/>
-              <a:t>4/4/2020</a:t>
+              <a:t>04-Apr-20</a:t>
             </a:fld>
             <a:endParaRPr lang="en-US"/>
           </a:p>
@@ -2344,7 +2344,7 @@
           <a:p>
             <a:fld id="{88AD2840-A1B5-46D5-88CF-FF803D9C05FA}" type="datetimeFigureOut">
               <a:rPr lang="en-US" smtClean="0"/>
-              <a:t>4/4/2020</a:t>
+              <a:t>04-Apr-20</a:t>
             </a:fld>
             <a:endParaRPr lang="en-US"/>
           </a:p>
@@ -2555,7 +2555,7 @@
           <a:p>
             <a:fld id="{88AD2840-A1B5-46D5-88CF-FF803D9C05FA}" type="datetimeFigureOut">
               <a:rPr lang="en-US" smtClean="0"/>
-              <a:t>4/4/2020</a:t>
+              <a:t>04-Apr-20</a:t>
             </a:fld>
             <a:endParaRPr lang="en-US"/>
           </a:p>
@@ -14643,7 +14643,7 @@
           <p:nvPr>
             <p:extLst>
               <p:ext uri="{D42A27DB-BD31-4B8C-83A1-F6EECF244321}">
-                <p14:modId xmlns:p14="http://schemas.microsoft.com/office/powerpoint/2010/main" val="3687486478"/>
+                <p14:modId xmlns:p14="http://schemas.microsoft.com/office/powerpoint/2010/main" val="2935704989"/>
               </p:ext>
             </p:extLst>
           </p:nvPr>
@@ -15064,8 +15064,19 @@
                           <a:latin typeface="Arial" panose="020B0604020202020204" pitchFamily="34" charset="0"/>
                           <a:cs typeface="Arial" panose="020B0604020202020204" pitchFamily="34" charset="0"/>
                         </a:rPr>
-                        <a:t>Implementing Sequence, Sequence items and Packages</a:t>
+                        <a:t>Implementing the Sequence, the Sequence items </a:t>
                       </a:r>
+                      <a:r>
+                        <a:rPr lang="en-US" sz="1300">
+                          <a:latin typeface="Arial" panose="020B0604020202020204" pitchFamily="34" charset="0"/>
+                          <a:cs typeface="Arial" panose="020B0604020202020204" pitchFamily="34" charset="0"/>
+                        </a:rPr>
+                        <a:t>and the Packages</a:t>
+                      </a:r>
+                      <a:endParaRPr lang="en-US" sz="1300" dirty="0">
+                        <a:latin typeface="Arial" panose="020B0604020202020204" pitchFamily="34" charset="0"/>
+                        <a:cs typeface="Arial" panose="020B0604020202020204" pitchFamily="34" charset="0"/>
+                      </a:endParaRPr>
                     </a:p>
                   </a:txBody>
                   <a:tcPr/>

</xml_diff>